<commit_message>
fix: Ajuste arquivo ppt de explicação
</commit_message>
<xml_diff>
--- a/Ticket Car.pptx
+++ b/Ticket Car.pptx
@@ -15,23 +15,24 @@
     <p:sldId id="260" r:id="rId10"/>
     <p:sldId id="261" r:id="rId11"/>
     <p:sldId id="262" r:id="rId12"/>
+    <p:sldId id="263" r:id="rId13"/>
   </p:sldIdLst>
   <p:sldSz cy="5143500" cx="9144000"/>
   <p:notesSz cx="6858000" cy="9144000"/>
   <p:embeddedFontLst>
     <p:embeddedFont>
       <p:font typeface="Montserrat"/>
-      <p:regular r:id="rId13"/>
-      <p:bold r:id="rId14"/>
-      <p:italic r:id="rId15"/>
-      <p:boldItalic r:id="rId16"/>
+      <p:regular r:id="rId14"/>
+      <p:bold r:id="rId15"/>
+      <p:italic r:id="rId16"/>
+      <p:boldItalic r:id="rId17"/>
     </p:embeddedFont>
     <p:embeddedFont>
       <p:font typeface="Lato"/>
-      <p:regular r:id="rId17"/>
-      <p:bold r:id="rId18"/>
-      <p:italic r:id="rId19"/>
-      <p:boldItalic r:id="rId20"/>
+      <p:regular r:id="rId18"/>
+      <p:bold r:id="rId19"/>
+      <p:italic r:id="rId20"/>
+      <p:boldItalic r:id="rId21"/>
     </p:embeddedFont>
   </p:embeddedFontLst>
   <p:defaultTextStyle>
@@ -1357,6 +1358,105 @@
       <p:sp>
         <p:nvSpPr>
           <p:cNvPr id="168" name="Google Shape;168;g1e7a0bba228_0_460:notes"/>
+          <p:cNvSpPr txBox="1"/>
+          <p:nvPr>
+            <p:ph idx="1" type="body"/>
+          </p:nvPr>
+        </p:nvSpPr>
+        <p:spPr>
+          <a:xfrm>
+            <a:off x="685800" y="4343400"/>
+            <a:ext cx="5486400" cy="4114800"/>
+          </a:xfrm>
+          <a:prstGeom prst="rect">
+            <a:avLst/>
+          </a:prstGeom>
+        </p:spPr>
+        <p:txBody>
+          <a:bodyPr anchorCtr="0" anchor="t" bIns="91425" lIns="91425" spcFirstLastPara="1" rIns="91425" wrap="square" tIns="91425">
+            <a:noAutofit/>
+          </a:bodyPr>
+          <a:lstStyle/>
+          <a:p>
+            <a:pPr indent="0" lvl="0" marL="0" rtl="0" algn="l">
+              <a:spcBef>
+                <a:spcPts val="0"/>
+              </a:spcBef>
+              <a:spcAft>
+                <a:spcPts val="0"/>
+              </a:spcAft>
+              <a:buNone/>
+            </a:pPr>
+            <a:r>
+              <a:t/>
+            </a:r>
+            <a:endParaRPr/>
+          </a:p>
+        </p:txBody>
+      </p:sp>
+    </p:spTree>
+  </p:cSld>
+  <p:clrMapOvr>
+    <a:masterClrMapping/>
+  </p:clrMapOvr>
+</p:notes>
+</file>
+
+<file path=ppt/notesSlides/notesSlide8.xml><?xml version="1.0" encoding="utf-8"?>
+<p:notes xmlns:a="http://schemas.openxmlformats.org/drawingml/2006/main" xmlns:r="http://schemas.openxmlformats.org/officeDocument/2006/relationships" xmlns:mc="http://schemas.openxmlformats.org/markup-compatibility/2006" xmlns:mv="urn:schemas-microsoft-com:mac:vml" xmlns:p="http://schemas.openxmlformats.org/presentationml/2006/main" xmlns:c="http://schemas.openxmlformats.org/drawingml/2006/chart" xmlns:dgm="http://schemas.openxmlformats.org/drawingml/2006/diagram" xmlns:o="urn:schemas-microsoft-com:office:office" xmlns:v="urn:schemas-microsoft-com:vml" xmlns:pvml="urn:schemas-microsoft-com:office:powerpoint" xmlns:com="http://schemas.openxmlformats.org/drawingml/2006/compatibility" xmlns:p14="http://schemas.microsoft.com/office/powerpoint/2010/main" xmlns:p15="http://schemas.microsoft.com/office/powerpoint/2012/main" xmlns:ahyp="http://schemas.microsoft.com/office/drawing/2018/hyperlinkcolor" showMasterPhAnim="0" showMasterSp="0">
+  <p:cSld>
+    <p:spTree>
+      <p:nvGrpSpPr>
+        <p:cNvPr id="172" name="Shape 172"/>
+        <p:cNvGrpSpPr/>
+        <p:nvPr/>
+      </p:nvGrpSpPr>
+      <p:grpSpPr>
+        <a:xfrm>
+          <a:off x="0" y="0"/>
+          <a:ext cx="0" cy="0"/>
+          <a:chOff x="0" y="0"/>
+          <a:chExt cx="0" cy="0"/>
+        </a:xfrm>
+      </p:grpSpPr>
+      <p:sp>
+        <p:nvSpPr>
+          <p:cNvPr id="173" name="Google Shape;173;g1e7a0bba6c7_0_7:notes"/>
+          <p:cNvSpPr/>
+          <p:nvPr>
+            <p:ph idx="2" type="sldImg"/>
+          </p:nvPr>
+        </p:nvSpPr>
+        <p:spPr>
+          <a:xfrm>
+            <a:off x="381300" y="685800"/>
+            <a:ext cx="6096000" cy="3429000"/>
+          </a:xfrm>
+          <a:custGeom>
+            <a:rect b="b" l="l" r="r" t="t"/>
+            <a:pathLst>
+              <a:path extrusionOk="0" h="120000" w="120000">
+                <a:moveTo>
+                  <a:pt x="0" y="0"/>
+                </a:moveTo>
+                <a:lnTo>
+                  <a:pt x="120000" y="0"/>
+                </a:lnTo>
+                <a:lnTo>
+                  <a:pt x="120000" y="120000"/>
+                </a:lnTo>
+                <a:lnTo>
+                  <a:pt x="0" y="120000"/>
+                </a:lnTo>
+                <a:close/>
+              </a:path>
+            </a:pathLst>
+          </a:custGeom>
+        </p:spPr>
+      </p:sp>
+      <p:sp>
+        <p:nvSpPr>
+          <p:cNvPr id="174" name="Google Shape;174;g1e7a0bba6c7_0_7:notes"/>
           <p:cNvSpPr txBox="1"/>
           <p:nvPr>
             <p:ph idx="1" type="body"/>
@@ -10466,7 +10566,7 @@
         </p:nvSpPr>
         <p:spPr>
           <a:xfrm>
-            <a:off x="1330200" y="417925"/>
+            <a:off x="1168975" y="417925"/>
             <a:ext cx="7635000" cy="914100"/>
           </a:xfrm>
           <a:prstGeom prst="rect">
@@ -10490,63 +10590,15 @@
             </a:pPr>
             <a:r>
               <a:rPr lang="en" sz="2100"/>
-              <a:t>Schema </a:t>
-            </a:r>
-            <a:r>
-              <a:rPr lang="en" sz="2100"/>
               <a:t>TOPIC_NOTA_FISCAL_ESTABELECIMENTO</a:t>
             </a:r>
             <a:endParaRPr sz="2100"/>
           </a:p>
         </p:txBody>
       </p:sp>
-      <p:sp>
-        <p:nvSpPr>
-          <p:cNvPr id="171" name="Google Shape;171;p19"/>
-          <p:cNvSpPr txBox="1"/>
-          <p:nvPr>
-            <p:ph idx="1" type="body"/>
-          </p:nvPr>
-        </p:nvSpPr>
-        <p:spPr>
-          <a:xfrm>
-            <a:off x="1297500" y="1567550"/>
-            <a:ext cx="7038900" cy="2911200"/>
-          </a:xfrm>
-          <a:prstGeom prst="rect">
-            <a:avLst/>
-          </a:prstGeom>
-        </p:spPr>
-        <p:txBody>
-          <a:bodyPr anchorCtr="0" anchor="t" bIns="91425" lIns="91425" spcFirstLastPara="1" rIns="91425" wrap="square" tIns="91425">
-            <a:noAutofit/>
-          </a:bodyPr>
-          <a:lstStyle/>
-          <a:p>
-            <a:pPr indent="0" lvl="0" marL="0" rtl="0" algn="l">
-              <a:spcBef>
-                <a:spcPts val="0"/>
-              </a:spcBef>
-              <a:spcAft>
-                <a:spcPts val="1200"/>
-              </a:spcAft>
-              <a:buNone/>
-            </a:pPr>
-            <a:r>
-              <a:t/>
-            </a:r>
-            <a:endParaRPr sz="700">
-              <a:latin typeface="Arial"/>
-              <a:ea typeface="Arial"/>
-              <a:cs typeface="Arial"/>
-              <a:sym typeface="Arial"/>
-            </a:endParaRPr>
-          </a:p>
-        </p:txBody>
-      </p:sp>
       <p:pic>
         <p:nvPicPr>
-          <p:cNvPr id="172" name="Google Shape;172;p19"/>
+          <p:cNvPr id="171" name="Google Shape;171;p19"/>
           <p:cNvPicPr preferRelativeResize="0"/>
           <p:nvPr/>
         </p:nvPicPr>
@@ -10560,8 +10612,101 @@
         </p:blipFill>
         <p:spPr>
           <a:xfrm>
-            <a:off x="2334275" y="828325"/>
-            <a:ext cx="3943350" cy="4276725"/>
+            <a:off x="1257650" y="843825"/>
+            <a:ext cx="3899350" cy="4229000"/>
+          </a:xfrm>
+          <a:prstGeom prst="rect">
+            <a:avLst/>
+          </a:prstGeom>
+          <a:noFill/>
+          <a:ln>
+            <a:noFill/>
+          </a:ln>
+        </p:spPr>
+      </p:pic>
+    </p:spTree>
+  </p:cSld>
+  <p:clrMapOvr>
+    <a:masterClrMapping/>
+  </p:clrMapOvr>
+</p:sld>
+</file>
+
+<file path=ppt/slides/slide8.xml><?xml version="1.0" encoding="utf-8"?>
+<p:sld xmlns:a="http://schemas.openxmlformats.org/drawingml/2006/main" xmlns:r="http://schemas.openxmlformats.org/officeDocument/2006/relationships" xmlns:mc="http://schemas.openxmlformats.org/markup-compatibility/2006" xmlns:mv="urn:schemas-microsoft-com:mac:vml" xmlns:p="http://schemas.openxmlformats.org/presentationml/2006/main" xmlns:c="http://schemas.openxmlformats.org/drawingml/2006/chart" xmlns:dgm="http://schemas.openxmlformats.org/drawingml/2006/diagram" xmlns:o="urn:schemas-microsoft-com:office:office" xmlns:v="urn:schemas-microsoft-com:vml" xmlns:pvml="urn:schemas-microsoft-com:office:powerpoint" xmlns:com="http://schemas.openxmlformats.org/drawingml/2006/compatibility" xmlns:p14="http://schemas.microsoft.com/office/powerpoint/2010/main" xmlns:p15="http://schemas.microsoft.com/office/powerpoint/2012/main" xmlns:ahyp="http://schemas.microsoft.com/office/drawing/2018/hyperlinkcolor">
+  <p:cSld>
+    <p:spTree>
+      <p:nvGrpSpPr>
+        <p:cNvPr id="175" name="Shape 175"/>
+        <p:cNvGrpSpPr/>
+        <p:nvPr/>
+      </p:nvGrpSpPr>
+      <p:grpSpPr>
+        <a:xfrm>
+          <a:off x="0" y="0"/>
+          <a:ext cx="0" cy="0"/>
+          <a:chOff x="0" y="0"/>
+          <a:chExt cx="0" cy="0"/>
+        </a:xfrm>
+      </p:grpSpPr>
+      <p:sp>
+        <p:nvSpPr>
+          <p:cNvPr id="176" name="Google Shape;176;p20"/>
+          <p:cNvSpPr txBox="1"/>
+          <p:nvPr>
+            <p:ph type="title"/>
+          </p:nvPr>
+        </p:nvSpPr>
+        <p:spPr>
+          <a:xfrm>
+            <a:off x="1297500" y="393750"/>
+            <a:ext cx="7038900" cy="914100"/>
+          </a:xfrm>
+          <a:prstGeom prst="rect">
+            <a:avLst/>
+          </a:prstGeom>
+        </p:spPr>
+        <p:txBody>
+          <a:bodyPr anchorCtr="0" anchor="t" bIns="91425" lIns="91425" spcFirstLastPara="1" rIns="91425" wrap="square" tIns="91425">
+            <a:normAutofit/>
+          </a:bodyPr>
+          <a:lstStyle/>
+          <a:p>
+            <a:pPr indent="0" lvl="0" marL="0" rtl="0" algn="l">
+              <a:spcBef>
+                <a:spcPts val="0"/>
+              </a:spcBef>
+              <a:spcAft>
+                <a:spcPts val="0"/>
+              </a:spcAft>
+              <a:buNone/>
+            </a:pPr>
+            <a:r>
+              <a:rPr lang="en"/>
+              <a:t>TOPIC_COBRANCA_VEICULO</a:t>
+            </a:r>
+            <a:endParaRPr/>
+          </a:p>
+        </p:txBody>
+      </p:sp>
+      <p:pic>
+        <p:nvPicPr>
+          <p:cNvPr id="177" name="Google Shape;177;p20"/>
+          <p:cNvPicPr preferRelativeResize="0"/>
+          <p:nvPr/>
+        </p:nvPicPr>
+        <p:blipFill>
+          <a:blip r:embed="rId3">
+            <a:alphaModFix/>
+          </a:blip>
+          <a:stretch>
+            <a:fillRect/>
+          </a:stretch>
+        </p:blipFill>
+        <p:spPr>
+          <a:xfrm>
+            <a:off x="1499549" y="911874"/>
+            <a:ext cx="3649825" cy="4078175"/>
           </a:xfrm>
           <a:prstGeom prst="rect">
             <a:avLst/>

</xml_diff>